<commit_message>
Work on extracting information from inside text and brackets
Need to work on removing any HTML tags leftover after first round of cleaning. (Probably need to rework the logic that does that.)
Need to work on correctly extracting items in double square brackets such as:
[[John Doe]].
</commit_message>
<xml_diff>
--- a/TestTargetProfileFromCode.pptx
+++ b/TestTargetProfileFromCode.pptx
@@ -5,10 +5,10 @@
     <p:sldMasterId id="2147483648" r:id="rId1"/>
   </p:sldMasterIdLst>
   <p:handoutMasterIdLst>
-    <p:handoutMasterId r:id="rId3"/>
+    <p:handoutMasterId r:id="rId2"/>
   </p:handoutMasterIdLst>
   <p:sldIdLst>
-    <p:sldId id="256" r:id="rId2"/>
+    <p:sldId id="256" r:id="rId7"/>
   </p:sldIdLst>
   <p:sldSz cx="12192000" cy="6858000"/>
   <p:notesSz cx="6858000" cy="9144000"/>
@@ -1551,7 +1551,7 @@
 </file>
 
 <file path=ppt/slides/slide1.xml><?xml version="1.0" encoding="utf-8"?>
-<p:sld xmlns:a="http://schemas.openxmlformats.org/drawingml/2006/main" xmlns:r="http://schemas.openxmlformats.org/officeDocument/2006/relationships" xmlns:p="http://schemas.openxmlformats.org/presentationml/2006/main">
+<p:sld xmlns:a="http://schemas.openxmlformats.org/drawingml/2006/main" xmlns:p="http://schemas.openxmlformats.org/presentationml/2006/main" xmlns:r="http://schemas.openxmlformats.org/officeDocument/2006/relationships">
   <p:cSld>
     <p:spTree>
       <p:nvGrpSpPr>
@@ -1559,14 +1559,7 @@
         <p:cNvGrpSpPr/>
         <p:nvPr/>
       </p:nvGrpSpPr>
-      <p:grpSpPr>
-        <a:xfrm>
-          <a:off x="0" y="0"/>
-          <a:ext cx="0" cy="0"/>
-          <a:chOff x="0" y="0"/>
-          <a:chExt cx="0" cy="0"/>
-        </a:xfrm>
-      </p:grpSpPr>
+      <p:grpSpPr/>
       <p:sp>
         <p:nvSpPr>
           <p:cNvPr id="2" name="Text Placeholder 1"/>
@@ -1574,7 +1567,7 @@
             <a:spLocks noGrp="1"/>
           </p:cNvSpPr>
           <p:nvPr>
-            <p:ph type="body" sz="quarter" idx="10"/>
+            <p:ph type="body" idx="10" sz="quarter"/>
           </p:nvPr>
         </p:nvSpPr>
         <p:spPr/>
@@ -1590,12 +1583,12 @@
       </p:sp>
       <p:pic>
         <p:nvPicPr>
-          <p:cNvPr id="3" name="Picture Placeholder 2" descr="Arron_Gaines.jpg"/>
+          <p:cNvPr id="3" name="Picture Placeholder 2" descr="ArronGaines.jpg"/>
           <p:cNvPicPr>
             <a:picLocks noGrp="1" noChangeAspect="1"/>
           </p:cNvPicPr>
           <p:nvPr>
-            <p:ph type="pic" sz="quarter" idx="12"/>
+            <p:ph type="pic" idx="12" sz="quarter"/>
           </p:nvPr>
         </p:nvPicPr>
         <p:blipFill>
@@ -1614,16 +1607,14 @@
             <a:spLocks noGrp="1"/>
           </p:cNvSpPr>
           <p:nvPr>
-            <p:ph type="body" sz="quarter" idx="13"/>
+            <p:ph type="body" idx="13" sz="quarter"/>
           </p:nvPr>
         </p:nvSpPr>
         <p:spPr/>
         <p:txBody>
           <a:bodyPr/>
           <a:lstStyle/>
-          <a:p>
-            <a:endParaRPr/>
-          </a:p>
+          <a:p/>
           <a:p>
             <a:r>
               <a:t>This is a multiline summary.</a:t>
@@ -1639,19 +1630,17 @@
               <a:t>Currently adding more information.</a:t>
             </a:r>
           </a:p>
-          <a:p>
-            <a:endParaRPr/>
-          </a:p>
+          <a:p/>
         </p:txBody>
       </p:sp>
       <p:pic>
         <p:nvPicPr>
-          <p:cNvPr id="5" name="Picture Placeholder 4" descr="350_Central_Park_West_Apartments.jpg"/>
+          <p:cNvPr id="5" name="Picture Placeholder 4" descr="350CentralParkWestApartments.jpg"/>
           <p:cNvPicPr>
             <a:picLocks noGrp="1" noChangeAspect="1"/>
           </p:cNvPicPr>
           <p:nvPr>
-            <p:ph type="pic" sz="quarter" idx="14"/>
+            <p:ph type="pic" idx="14" sz="quarter"/>
           </p:nvPr>
         </p:nvPicPr>
         <p:blipFill>
@@ -1665,12 +1654,12 @@
       </p:pic>
       <p:pic>
         <p:nvPicPr>
-          <p:cNvPr id="6" name="Picture Placeholder 5" descr="30_Rockefeller_Plaza.jpg"/>
+          <p:cNvPr id="6" name="Picture Placeholder 5" descr="30RockefellerPlaza.jpg"/>
           <p:cNvPicPr>
             <a:picLocks noGrp="1" noChangeAspect="1"/>
           </p:cNvPicPr>
           <p:nvPr>
-            <p:ph type="pic" sz="quarter" idx="15"/>
+            <p:ph type="pic" idx="15" sz="quarter"/>
           </p:nvPr>
         </p:nvPicPr>
         <p:blipFill>

</xml_diff>